<commit_message>
Update lectures after Durham HPC day
</commit_message>
<xml_diff>
--- a/lectures/powerpoints/Conclusions.pptx
+++ b/lectures/powerpoints/Conclusions.pptx
@@ -141,7 +141,7 @@
 <file path=ppt/revisionInfo.xml><?xml version="1.0" encoding="utf-8"?>
 <p1510:revInfo xmlns:a="http://schemas.openxmlformats.org/drawingml/2006/main" xmlns:r="http://schemas.openxmlformats.org/officeDocument/2006/relationships" xmlns:p1510="http://schemas.microsoft.com/office/powerpoint/2015/10/main">
   <p1510:revLst>
-    <p1510:client id="{02C3BCA1-6F43-4A4E-B8F5-B6166AEA8E22}" v="2" dt="2024-05-01T21:03:29.856"/>
+    <p1510:client id="{84C216EB-D1E2-46BE-B5B7-BAD2ED917DDC}" v="2" dt="2024-05-06T16:24:23.039"/>
   </p1510:revLst>
 </p1510:revInfo>
 </file>
@@ -203,7 +203,7 @@
           <a:p>
             <a:fld id="{237A3326-6BE8-4DE2-A526-66D6DC5DC342}" type="datetimeFigureOut">
               <a:rPr lang="en-GB" smtClean="0"/>
-              <a:t>01/05/2024</a:t>
+              <a:t>06/05/2024</a:t>
             </a:fld>
             <a:endParaRPr lang="en-GB"/>
           </a:p>
@@ -380,7 +380,7 @@
           <a:p>
             <a:fld id="{198E9702-0021-4473-93B9-41638846F4C4}" type="datetimeFigureOut">
               <a:rPr lang="en-GB" smtClean="0"/>
-              <a:t>01/05/2024</a:t>
+              <a:t>06/05/2024</a:t>
             </a:fld>
             <a:endParaRPr lang="en-GB"/>
           </a:p>
@@ -892,7 +892,7 @@
           <a:p>
             <a:fld id="{B1836D41-3C4D-1D49-AA54-4231464E6415}" type="datetimeFigureOut">
               <a:rPr lang="en-US" smtClean="0"/>
-              <a:t>5/1/2024</a:t>
+              <a:t>5/6/2024</a:t>
             </a:fld>
             <a:endParaRPr lang="en-US"/>
           </a:p>
@@ -1096,7 +1096,7 @@
           <a:p>
             <a:fld id="{B1836D41-3C4D-1D49-AA54-4231464E6415}" type="datetimeFigureOut">
               <a:rPr lang="en-US" smtClean="0"/>
-              <a:t>5/1/2024</a:t>
+              <a:t>5/6/2024</a:t>
             </a:fld>
             <a:endParaRPr lang="en-US"/>
           </a:p>
@@ -1277,7 +1277,7 @@
           <a:p>
             <a:fld id="{B1836D41-3C4D-1D49-AA54-4231464E6415}" type="datetimeFigureOut">
               <a:rPr lang="en-US" smtClean="0"/>
-              <a:t>5/1/2024</a:t>
+              <a:t>5/6/2024</a:t>
             </a:fld>
             <a:endParaRPr lang="en-US"/>
           </a:p>
@@ -1452,7 +1452,7 @@
           <a:p>
             <a:fld id="{B1836D41-3C4D-1D49-AA54-4231464E6415}" type="datetimeFigureOut">
               <a:rPr lang="en-US" smtClean="0"/>
-              <a:t>5/1/2024</a:t>
+              <a:t>5/6/2024</a:t>
             </a:fld>
             <a:endParaRPr lang="en-US"/>
           </a:p>
@@ -1700,7 +1700,7 @@
           <a:p>
             <a:fld id="{B1836D41-3C4D-1D49-AA54-4231464E6415}" type="datetimeFigureOut">
               <a:rPr lang="en-US" smtClean="0"/>
-              <a:t>5/1/2024</a:t>
+              <a:t>5/6/2024</a:t>
             </a:fld>
             <a:endParaRPr lang="en-US"/>
           </a:p>
@@ -2017,7 +2017,7 @@
           <a:p>
             <a:fld id="{B1836D41-3C4D-1D49-AA54-4231464E6415}" type="datetimeFigureOut">
               <a:rPr lang="en-US" smtClean="0"/>
-              <a:t>5/1/2024</a:t>
+              <a:t>5/6/2024</a:t>
             </a:fld>
             <a:endParaRPr lang="en-US"/>
           </a:p>
@@ -2483,7 +2483,7 @@
           <a:p>
             <a:fld id="{B1836D41-3C4D-1D49-AA54-4231464E6415}" type="datetimeFigureOut">
               <a:rPr lang="en-US" smtClean="0"/>
-              <a:t>5/1/2024</a:t>
+              <a:t>5/6/2024</a:t>
             </a:fld>
             <a:endParaRPr lang="en-US"/>
           </a:p>
@@ -2630,7 +2630,7 @@
           <a:p>
             <a:fld id="{B1836D41-3C4D-1D49-AA54-4231464E6415}" type="datetimeFigureOut">
               <a:rPr lang="en-US" smtClean="0"/>
-              <a:t>5/1/2024</a:t>
+              <a:t>5/6/2024</a:t>
             </a:fld>
             <a:endParaRPr lang="en-US"/>
           </a:p>
@@ -2720,7 +2720,7 @@
           <a:p>
             <a:fld id="{B1836D41-3C4D-1D49-AA54-4231464E6415}" type="datetimeFigureOut">
               <a:rPr lang="en-US" smtClean="0"/>
-              <a:t>5/1/2024</a:t>
+              <a:t>5/6/2024</a:t>
             </a:fld>
             <a:endParaRPr lang="en-US"/>
           </a:p>
@@ -2994,7 +2994,7 @@
           <a:p>
             <a:fld id="{B1836D41-3C4D-1D49-AA54-4231464E6415}" type="datetimeFigureOut">
               <a:rPr lang="en-US" smtClean="0"/>
-              <a:t>5/1/2024</a:t>
+              <a:t>5/6/2024</a:t>
             </a:fld>
             <a:endParaRPr lang="en-US"/>
           </a:p>
@@ -3299,7 +3299,7 @@
           <a:p>
             <a:fld id="{B1836D41-3C4D-1D49-AA54-4231464E6415}" type="datetimeFigureOut">
               <a:rPr lang="en-US" smtClean="0"/>
-              <a:t>5/1/2024</a:t>
+              <a:t>5/6/2024</a:t>
             </a:fld>
             <a:endParaRPr lang="en-US"/>
           </a:p>
@@ -3596,7 +3596,7 @@
           <a:p>
             <a:fld id="{B1836D41-3C4D-1D49-AA54-4231464E6415}" type="datetimeFigureOut">
               <a:rPr lang="en-US" smtClean="0"/>
-              <a:t>5/1/2024</a:t>
+              <a:t>5/6/2024</a:t>
             </a:fld>
             <a:endParaRPr lang="en-US"/>
           </a:p>
@@ -4189,10 +4189,10 @@
       </p:pic>
       <p:pic>
         <p:nvPicPr>
-          <p:cNvPr id="4" name="Picture 2" descr="Nick Brown">
+          <p:cNvPr id="2" name="Picture 2" descr="Nick Brown">
             <a:extLst>
               <a:ext uri="{FF2B5EF4-FFF2-40B4-BE49-F238E27FC236}">
-                <a16:creationId xmlns:a16="http://schemas.microsoft.com/office/drawing/2014/main" id="{7FBAEACA-9714-9E20-A4DA-8EE46DB0C8EA}"/>
+                <a16:creationId xmlns:a16="http://schemas.microsoft.com/office/drawing/2014/main" id="{C8BA0C96-07DC-2829-C132-0E518B729608}"/>
               </a:ext>
             </a:extLst>
           </p:cNvPr>
@@ -4241,10 +4241,10 @@
       </p:pic>
       <p:sp>
         <p:nvSpPr>
-          <p:cNvPr id="5" name="TextBox 4">
+          <p:cNvPr id="7" name="TextBox 6">
             <a:extLst>
               <a:ext uri="{FF2B5EF4-FFF2-40B4-BE49-F238E27FC236}">
-                <a16:creationId xmlns:a16="http://schemas.microsoft.com/office/drawing/2014/main" id="{8037B0EE-2DCD-CD8B-6421-9F7177ACDB9A}"/>
+                <a16:creationId xmlns:a16="http://schemas.microsoft.com/office/drawing/2014/main" id="{1D8489E4-A2F5-0116-B967-D9C8CD1146B3}"/>
               </a:ext>
             </a:extLst>
           </p:cNvPr>
@@ -4282,55 +4282,12 @@
           </a:p>
         </p:txBody>
       </p:sp>
-      <p:sp>
-        <p:nvSpPr>
-          <p:cNvPr id="6" name="TextBox 5">
+      <p:pic>
+        <p:nvPicPr>
+          <p:cNvPr id="8" name="Picture 7" descr="David Kacs in Bayes building">
             <a:extLst>
               <a:ext uri="{FF2B5EF4-FFF2-40B4-BE49-F238E27FC236}">
-                <a16:creationId xmlns:a16="http://schemas.microsoft.com/office/drawing/2014/main" id="{17F17CE2-D7AE-A4AD-9A54-A2A92DB6E1FF}"/>
-              </a:ext>
-            </a:extLst>
-          </p:cNvPr>
-          <p:cNvSpPr txBox="1"/>
-          <p:nvPr/>
-        </p:nvSpPr>
-        <p:spPr>
-          <a:xfrm>
-            <a:off x="3133317" y="4911595"/>
-            <a:ext cx="2064097" cy="923330"/>
-          </a:xfrm>
-          <a:prstGeom prst="rect">
-            <a:avLst/>
-          </a:prstGeom>
-          <a:noFill/>
-        </p:spPr>
-        <p:txBody>
-          <a:bodyPr wrap="square" rtlCol="0">
-            <a:spAutoFit/>
-          </a:bodyPr>
-          <a:lstStyle/>
-          <a:p>
-            <a:pPr algn="ctr"/>
-            <a:r>
-              <a:rPr lang="en-GB" dirty="0"/>
-              <a:t>Joseph Lee</a:t>
-            </a:r>
-          </a:p>
-          <a:p>
-            <a:pPr algn="ctr"/>
-            <a:r>
-              <a:rPr lang="en-GB" dirty="0"/>
-              <a:t>EPCC University of Edinburgh</a:t>
-            </a:r>
-          </a:p>
-        </p:txBody>
-      </p:sp>
-      <p:pic>
-        <p:nvPicPr>
-          <p:cNvPr id="11" name="Picture 2" descr="Joseph Lee">
-            <a:extLst>
-              <a:ext uri="{FF2B5EF4-FFF2-40B4-BE49-F238E27FC236}">
-                <a16:creationId xmlns:a16="http://schemas.microsoft.com/office/drawing/2014/main" id="{A0672C2E-FA39-AA47-CFE0-36EAFF7DDA51}"/>
+                <a16:creationId xmlns:a16="http://schemas.microsoft.com/office/drawing/2014/main" id="{C1CD65CD-E657-C211-DDC9-8E57FB051651}"/>
               </a:ext>
             </a:extLst>
           </p:cNvPr>
@@ -4341,56 +4298,6 @@
         </p:nvPicPr>
         <p:blipFill rotWithShape="1">
           <a:blip r:embed="rId7">
-            <a:extLst>
-              <a:ext uri="{28A0092B-C50C-407E-A947-70E740481C1C}">
-                <a14:useLocalDpi xmlns:a14="http://schemas.microsoft.com/office/drawing/2010/main" val="0"/>
-              </a:ext>
-            </a:extLst>
-          </a:blip>
-          <a:srcRect l="10311" r="10311" b="40928"/>
-          <a:stretch/>
-        </p:blipFill>
-        <p:spPr bwMode="auto">
-          <a:xfrm>
-            <a:off x="3078820" y="2697289"/>
-            <a:ext cx="2173089" cy="2184572"/>
-          </a:xfrm>
-          <a:prstGeom prst="ellipse">
-            <a:avLst/>
-          </a:prstGeom>
-          <a:ln>
-            <a:noFill/>
-          </a:ln>
-          <a:effectLst>
-            <a:softEdge rad="112500"/>
-          </a:effectLst>
-          <a:extLst>
-            <a:ext uri="{909E8E84-426E-40DD-AFC4-6F175D3DCCD1}">
-              <a14:hiddenFill xmlns:a14="http://schemas.microsoft.com/office/drawing/2010/main">
-                <a:solidFill>
-                  <a:srgbClr val="FFFFFF"/>
-                </a:solidFill>
-              </a14:hiddenFill>
-            </a:ext>
-          </a:extLst>
-        </p:spPr>
-      </p:pic>
-      <p:pic>
-        <p:nvPicPr>
-          <p:cNvPr id="12" name="Picture 11" descr="David Kacs in Bayes building">
-            <a:extLst>
-              <a:ext uri="{FF2B5EF4-FFF2-40B4-BE49-F238E27FC236}">
-                <a16:creationId xmlns:a16="http://schemas.microsoft.com/office/drawing/2014/main" id="{58CC5C49-31B9-536B-89BB-F64141816FE1}"/>
-              </a:ext>
-            </a:extLst>
-          </p:cNvPr>
-          <p:cNvPicPr>
-            <a:picLocks noChangeAspect="1" noChangeArrowheads="1"/>
-          </p:cNvPicPr>
-          <p:nvPr/>
-        </p:nvPicPr>
-        <p:blipFill rotWithShape="1">
-          <a:blip r:embed="rId8">
             <a:extLst>
               <a:ext uri="{28A0092B-C50C-407E-A947-70E740481C1C}">
                 <a14:useLocalDpi xmlns:a14="http://schemas.microsoft.com/office/drawing/2010/main" val="0"/>
@@ -4427,10 +4334,10 @@
       </p:pic>
       <p:sp>
         <p:nvSpPr>
-          <p:cNvPr id="13" name="TextBox 12">
+          <p:cNvPr id="9" name="TextBox 8">
             <a:extLst>
               <a:ext uri="{FF2B5EF4-FFF2-40B4-BE49-F238E27FC236}">
-                <a16:creationId xmlns:a16="http://schemas.microsoft.com/office/drawing/2014/main" id="{7588C170-CC15-D2D0-F38A-668DF85FC296}"/>
+                <a16:creationId xmlns:a16="http://schemas.microsoft.com/office/drawing/2014/main" id="{5B18FF65-196A-6331-861F-012E257162B9}"/>
               </a:ext>
             </a:extLst>
           </p:cNvPr>
@@ -4475,10 +4382,10 @@
       </p:sp>
       <p:pic>
         <p:nvPicPr>
-          <p:cNvPr id="14" name="Picture 6" descr="Justs Zarins">
+          <p:cNvPr id="16" name="Picture 6" descr="Justs Zarins">
             <a:extLst>
               <a:ext uri="{FF2B5EF4-FFF2-40B4-BE49-F238E27FC236}">
-                <a16:creationId xmlns:a16="http://schemas.microsoft.com/office/drawing/2014/main" id="{C6A3F25F-DD9B-DD5A-507A-82FCD77E5609}"/>
+                <a16:creationId xmlns:a16="http://schemas.microsoft.com/office/drawing/2014/main" id="{5DEDD84C-FEB1-4B7C-5A43-11878BEC9694}"/>
               </a:ext>
             </a:extLst>
           </p:cNvPr>
@@ -4488,7 +4395,7 @@
           <p:nvPr/>
         </p:nvPicPr>
         <p:blipFill>
-          <a:blip r:embed="rId9">
+          <a:blip r:embed="rId8">
             <a:extLst>
               <a:ext uri="{28A0092B-C50C-407E-A947-70E740481C1C}">
                 <a14:useLocalDpi xmlns:a14="http://schemas.microsoft.com/office/drawing/2010/main" val="0"/>
@@ -4527,10 +4434,10 @@
       </p:pic>
       <p:sp>
         <p:nvSpPr>
-          <p:cNvPr id="15" name="TextBox 14">
+          <p:cNvPr id="17" name="TextBox 16">
             <a:extLst>
               <a:ext uri="{FF2B5EF4-FFF2-40B4-BE49-F238E27FC236}">
-                <a16:creationId xmlns:a16="http://schemas.microsoft.com/office/drawing/2014/main" id="{C16BF079-7085-B1C4-D5CA-9CFF13251D7C}"/>
+                <a16:creationId xmlns:a16="http://schemas.microsoft.com/office/drawing/2014/main" id="{2A2CB731-3A61-1DB4-90F1-E2E07E179E36}"/>
               </a:ext>
             </a:extLst>
           </p:cNvPr>
@@ -4577,6 +4484,122 @@
           </a:p>
         </p:txBody>
       </p:sp>
+      <p:sp>
+        <p:nvSpPr>
+          <p:cNvPr id="18" name="TextBox 17">
+            <a:extLst>
+              <a:ext uri="{FF2B5EF4-FFF2-40B4-BE49-F238E27FC236}">
+                <a16:creationId xmlns:a16="http://schemas.microsoft.com/office/drawing/2014/main" id="{8D201A23-094C-2B56-89A0-E24B52580E46}"/>
+              </a:ext>
+            </a:extLst>
+          </p:cNvPr>
+          <p:cNvSpPr txBox="1"/>
+          <p:nvPr/>
+        </p:nvSpPr>
+        <p:spPr>
+          <a:xfrm>
+            <a:off x="3215221" y="5016539"/>
+            <a:ext cx="2064097" cy="646331"/>
+          </a:xfrm>
+          <a:prstGeom prst="rect">
+            <a:avLst/>
+          </a:prstGeom>
+          <a:noFill/>
+        </p:spPr>
+        <p:txBody>
+          <a:bodyPr wrap="square" rtlCol="0">
+            <a:spAutoFit/>
+          </a:bodyPr>
+          <a:lstStyle/>
+          <a:p>
+            <a:pPr algn="ctr"/>
+            <a:r>
+              <a:rPr lang="en-GB" sz="1800" b="0" i="0" u="none" strike="noStrike" dirty="0">
+                <a:solidFill>
+                  <a:srgbClr val="000000"/>
+                </a:solidFill>
+                <a:effectLst/>
+                <a:latin typeface="Arial" panose="020B0604020202020204" pitchFamily="34" charset="0"/>
+              </a:rPr>
+              <a:t>Leighton Wilson</a:t>
+            </a:r>
+          </a:p>
+          <a:p>
+            <a:pPr algn="ctr"/>
+            <a:r>
+              <a:rPr lang="en-GB" dirty="0" err="1">
+                <a:solidFill>
+                  <a:srgbClr val="000000"/>
+                </a:solidFill>
+                <a:latin typeface="Arial" panose="020B0604020202020204" pitchFamily="34" charset="0"/>
+              </a:rPr>
+              <a:t>Cerebras</a:t>
+            </a:r>
+            <a:r>
+              <a:rPr lang="en-GB" dirty="0">
+                <a:solidFill>
+                  <a:srgbClr val="000000"/>
+                </a:solidFill>
+                <a:latin typeface="Arial" panose="020B0604020202020204" pitchFamily="34" charset="0"/>
+              </a:rPr>
+              <a:t> Systems</a:t>
+            </a:r>
+            <a:endParaRPr lang="en-GB" dirty="0"/>
+          </a:p>
+        </p:txBody>
+      </p:sp>
+      <p:pic>
+        <p:nvPicPr>
+          <p:cNvPr id="19" name="Picture 4" descr="Leighton Wilson, Author at Cerebras">
+            <a:extLst>
+              <a:ext uri="{FF2B5EF4-FFF2-40B4-BE49-F238E27FC236}">
+                <a16:creationId xmlns:a16="http://schemas.microsoft.com/office/drawing/2014/main" id="{E48D55A3-2F4E-80C7-236C-BF4AE3D2DFBA}"/>
+              </a:ext>
+            </a:extLst>
+          </p:cNvPr>
+          <p:cNvPicPr>
+            <a:picLocks noChangeAspect="1" noChangeArrowheads="1"/>
+          </p:cNvPicPr>
+          <p:nvPr/>
+        </p:nvPicPr>
+        <p:blipFill>
+          <a:blip r:embed="rId9">
+            <a:extLst>
+              <a:ext uri="{28A0092B-C50C-407E-A947-70E740481C1C}">
+                <a14:useLocalDpi xmlns:a14="http://schemas.microsoft.com/office/drawing/2010/main" val="0"/>
+              </a:ext>
+            </a:extLst>
+          </a:blip>
+          <a:srcRect/>
+          <a:stretch>
+            <a:fillRect/>
+          </a:stretch>
+        </p:blipFill>
+        <p:spPr bwMode="auto">
+          <a:xfrm>
+            <a:off x="3242904" y="2619567"/>
+            <a:ext cx="2248566" cy="2248566"/>
+          </a:xfrm>
+          <a:prstGeom prst="ellipse">
+            <a:avLst/>
+          </a:prstGeom>
+          <a:ln>
+            <a:noFill/>
+          </a:ln>
+          <a:effectLst>
+            <a:softEdge rad="112500"/>
+          </a:effectLst>
+          <a:extLst>
+            <a:ext uri="{909E8E84-426E-40DD-AFC4-6F175D3DCCD1}">
+              <a14:hiddenFill xmlns:a14="http://schemas.microsoft.com/office/drawing/2010/main">
+                <a:solidFill>
+                  <a:srgbClr val="FFFFFF"/>
+                </a:solidFill>
+              </a14:hiddenFill>
+            </a:ext>
+          </a:extLst>
+        </p:spPr>
+      </p:pic>
     </p:spTree>
     <p:extLst>
       <p:ext uri="{BB962C8B-B14F-4D97-AF65-F5344CB8AC3E}">
@@ -8493,7 +8516,7 @@
         <p:spPr/>
         <p:txBody>
           <a:bodyPr>
-            <a:normAutofit lnSpcReduction="10000"/>
+            <a:normAutofit fontScale="92500" lnSpcReduction="10000"/>
           </a:bodyPr>
           <a:lstStyle/>
           <a:p>
@@ -8573,8 +8596,15 @@
             <a:pPr lvl="1"/>
             <a:r>
               <a:rPr lang="en-GB" dirty="0"/>
-              <a:t>Roughly monthly meetings</a:t>
-            </a:r>
+              <a:t>Roughly monthly meetings: </a:t>
+            </a:r>
+            <a:r>
+              <a:rPr lang="en-GB" dirty="0">
+                <a:hlinkClick r:id="rId5"/>
+              </a:rPr>
+              <a:t>https://www.cerebras.net/developers/community/</a:t>
+            </a:r>
+            <a:endParaRPr lang="en-GB" dirty="0"/>
           </a:p>
           <a:p>
             <a:pPr lvl="1"/>
@@ -8604,6 +8634,22 @@
               <a:rPr lang="en-GB" dirty="0"/>
               <a:t>The SDK is free to download, meaning you can have a copy of the compiler and simulator on your own local machine</a:t>
             </a:r>
+          </a:p>
+          <a:p>
+            <a:pPr lvl="1"/>
+            <a:r>
+              <a:rPr lang="en-GB" dirty="0">
+                <a:hlinkClick r:id="rId6"/>
+              </a:rPr>
+              <a:t>https://www.cerebras.net/developers/sdk</a:t>
+            </a:r>
+            <a:r>
+              <a:rPr lang="en-GB">
+                <a:hlinkClick r:id="rId6"/>
+              </a:rPr>
+              <a:t>-request/</a:t>
+            </a:r>
+            <a:endParaRPr lang="en-GB" dirty="0"/>
           </a:p>
           <a:p>
             <a:pPr lvl="1"/>

</xml_diff>